<commit_message>
change: add github link
</commit_message>
<xml_diff>
--- a/example3/graphql.pptx
+++ b/example3/graphql.pptx
@@ -218,7 +218,7 @@
           <a:effectLst/>
           <a:extLst>
             <a:ext uri="{91240B29-F687-4f45-9708-019B960494DF}">
-              <a14:hiddenLine xmlns="" xmlns:a14="http://schemas.microsoft.com/office/drawing/2010/main" w="9525">
+              <a14:hiddenLine xmlns:a14="http://schemas.microsoft.com/office/drawing/2010/main" xmlns="" w="9525">
                 <a:solidFill>
                   <a:srgbClr val="000000"/>
                 </a:solidFill>
@@ -1728,7 +1728,7 @@
           <a:ln/>
           <a:extLst>
             <a:ext uri="{91240B29-F687-4f45-9708-019B960494DF}">
-              <a14:hiddenLine xmlns="" xmlns:a14="http://schemas.microsoft.com/office/drawing/2010/main" w="9525">
+              <a14:hiddenLine xmlns:a14="http://schemas.microsoft.com/office/drawing/2010/main" xmlns="" w="9525">
                 <a:solidFill>
                   <a:srgbClr val="000000"/>
                 </a:solidFill>
@@ -2000,7 +2000,7 @@
           <a:ln/>
           <a:extLst>
             <a:ext uri="{91240B29-F687-4f45-9708-019B960494DF}">
-              <a14:hiddenLine xmlns="" xmlns:a14="http://schemas.microsoft.com/office/drawing/2010/main" w="9525">
+              <a14:hiddenLine xmlns:a14="http://schemas.microsoft.com/office/drawing/2010/main" xmlns="" w="9525">
                 <a:solidFill>
                   <a:srgbClr val="000000"/>
                 </a:solidFill>
@@ -2280,7 +2280,7 @@
           <a:ln/>
           <a:extLst>
             <a:ext uri="{91240B29-F687-4f45-9708-019B960494DF}">
-              <a14:hiddenLine xmlns="" xmlns:a14="http://schemas.microsoft.com/office/drawing/2010/main" w="9525">
+              <a14:hiddenLine xmlns:a14="http://schemas.microsoft.com/office/drawing/2010/main" xmlns="" w="9525">
                 <a:solidFill>
                   <a:srgbClr val="000000"/>
                 </a:solidFill>
@@ -2900,7 +2900,7 @@
           <a:ln/>
           <a:extLst>
             <a:ext uri="{91240B29-F687-4f45-9708-019B960494DF}">
-              <a14:hiddenLine xmlns="" xmlns:a14="http://schemas.microsoft.com/office/drawing/2010/main" w="9525">
+              <a14:hiddenLine xmlns:a14="http://schemas.microsoft.com/office/drawing/2010/main" xmlns="" w="9525">
                 <a:solidFill>
                   <a:srgbClr val="000000"/>
                 </a:solidFill>
@@ -3236,7 +3236,7 @@
           <a:ln/>
           <a:extLst>
             <a:ext uri="{91240B29-F687-4f45-9708-019B960494DF}">
-              <a14:hiddenLine xmlns="" xmlns:a14="http://schemas.microsoft.com/office/drawing/2010/main" w="9525">
+              <a14:hiddenLine xmlns:a14="http://schemas.microsoft.com/office/drawing/2010/main" xmlns="" w="9525">
                 <a:solidFill>
                   <a:srgbClr val="000000"/>
                 </a:solidFill>
@@ -3710,7 +3710,7 @@
           <a:ln/>
           <a:extLst>
             <a:ext uri="{91240B29-F687-4f45-9708-019B960494DF}">
-              <a14:hiddenLine xmlns="" xmlns:a14="http://schemas.microsoft.com/office/drawing/2010/main" w="9525">
+              <a14:hiddenLine xmlns:a14="http://schemas.microsoft.com/office/drawing/2010/main" xmlns="" w="9525">
                 <a:solidFill>
                   <a:srgbClr val="000000"/>
                 </a:solidFill>
@@ -4133,7 +4133,7 @@
           <a:ln/>
           <a:extLst>
             <a:ext uri="{91240B29-F687-4f45-9708-019B960494DF}">
-              <a14:hiddenLine xmlns="" xmlns:a14="http://schemas.microsoft.com/office/drawing/2010/main" w="9525">
+              <a14:hiddenLine xmlns:a14="http://schemas.microsoft.com/office/drawing/2010/main" xmlns="" w="9525">
                 <a:solidFill>
                   <a:srgbClr val="000000"/>
                 </a:solidFill>
@@ -5477,6 +5477,44 @@
           </a:p>
         </p:txBody>
       </p:sp>
+      <p:sp>
+        <p:nvSpPr>
+          <p:cNvPr id="3" name="TextBox 2">
+            <a:extLst>
+              <a:ext uri="{FF2B5EF4-FFF2-40B4-BE49-F238E27FC236}">
+                <a16:creationId xmlns:a16="http://schemas.microsoft.com/office/drawing/2014/main" id="{B090F471-FC4E-3F4F-9628-D2262E9E47B1}"/>
+              </a:ext>
+            </a:extLst>
+          </p:cNvPr>
+          <p:cNvSpPr txBox="1"/>
+          <p:nvPr/>
+        </p:nvSpPr>
+        <p:spPr>
+          <a:xfrm>
+            <a:off x="810001" y="5545777"/>
+            <a:ext cx="8716488" cy="369332"/>
+          </a:xfrm>
+          <a:prstGeom prst="rect">
+            <a:avLst/>
+          </a:prstGeom>
+          <a:noFill/>
+        </p:spPr>
+        <p:txBody>
+          <a:bodyPr wrap="square" rtlCol="0">
+            <a:spAutoFit/>
+          </a:bodyPr>
+          <a:lstStyle/>
+          <a:p>
+            <a:r>
+              <a:rPr lang="en-US" dirty="0">
+                <a:hlinkClick r:id="rId2"/>
+              </a:rPr>
+              <a:t>https://github.com/QimingChen/spring_graphql/tree/master/example3</a:t>
+            </a:r>
+            <a:endParaRPr lang="en-US" dirty="0"/>
+          </a:p>
+        </p:txBody>
+      </p:sp>
     </p:spTree>
     <p:extLst>
       <p:ext uri="{BB962C8B-B14F-4D97-AF65-F5344CB8AC3E}">

</xml_diff>